<commit_message>
Add and update Session 4 files.
</commit_message>
<xml_diff>
--- a/CPSC-24700/Presentations/HTML5.pptx
+++ b/CPSC-24700/Presentations/HTML5.pptx
@@ -279,7 +279,7 @@
           <a:p>
             <a:fld id="{82AC26F5-A2E7-4901-A403-BBD25C17198C}" type="datetimeFigureOut">
               <a:rPr lang="en-US" smtClean="0"/>
-              <a:t>8/24/2017</a:t>
+              <a:t>9/5/2017</a:t>
             </a:fld>
             <a:endParaRPr lang="en-US"/>
           </a:p>
@@ -675,7 +675,7 @@
           <a:p>
             <a:fld id="{FB7712AD-3B21-4FE9-B722-CF9B0200D9B9}" type="datetimeFigureOut">
               <a:rPr lang="en-US" smtClean="0"/>
-              <a:t>8/24/2017</a:t>
+              <a:t>9/5/2017</a:t>
             </a:fld>
             <a:endParaRPr lang="en-US"/>
           </a:p>
@@ -855,7 +855,7 @@
           <a:p>
             <a:fld id="{FB7712AD-3B21-4FE9-B722-CF9B0200D9B9}" type="datetimeFigureOut">
               <a:rPr lang="en-US" smtClean="0"/>
-              <a:t>8/24/2017</a:t>
+              <a:t>9/5/2017</a:t>
             </a:fld>
             <a:endParaRPr lang="en-US"/>
           </a:p>
@@ -1045,7 +1045,7 @@
           <a:p>
             <a:fld id="{FB7712AD-3B21-4FE9-B722-CF9B0200D9B9}" type="datetimeFigureOut">
               <a:rPr lang="en-US" smtClean="0"/>
-              <a:t>8/24/2017</a:t>
+              <a:t>9/5/2017</a:t>
             </a:fld>
             <a:endParaRPr lang="en-US"/>
           </a:p>
@@ -1268,7 +1268,7 @@
           <a:p>
             <a:fld id="{FB7712AD-3B21-4FE9-B722-CF9B0200D9B9}" type="datetimeFigureOut">
               <a:rPr lang="en-US" smtClean="0"/>
-              <a:t>8/24/2017</a:t>
+              <a:t>9/5/2017</a:t>
             </a:fld>
             <a:endParaRPr lang="en-US"/>
           </a:p>
@@ -1471,7 +1471,7 @@
           <a:p>
             <a:fld id="{FB7712AD-3B21-4FE9-B722-CF9B0200D9B9}" type="datetimeFigureOut">
               <a:rPr lang="en-US" smtClean="0"/>
-              <a:t>8/24/2017</a:t>
+              <a:t>9/5/2017</a:t>
             </a:fld>
             <a:endParaRPr lang="en-US"/>
           </a:p>
@@ -1768,7 +1768,7 @@
           <a:p>
             <a:fld id="{FB7712AD-3B21-4FE9-B722-CF9B0200D9B9}" type="datetimeFigureOut">
               <a:rPr lang="en-US" smtClean="0"/>
-              <a:t>8/24/2017</a:t>
+              <a:t>9/5/2017</a:t>
             </a:fld>
             <a:endParaRPr lang="en-US"/>
           </a:p>
@@ -2204,7 +2204,7 @@
           <a:p>
             <a:fld id="{FB7712AD-3B21-4FE9-B722-CF9B0200D9B9}" type="datetimeFigureOut">
               <a:rPr lang="en-US" smtClean="0"/>
-              <a:t>8/24/2017</a:t>
+              <a:t>9/5/2017</a:t>
             </a:fld>
             <a:endParaRPr lang="en-US"/>
           </a:p>
@@ -2333,7 +2333,7 @@
           <a:p>
             <a:fld id="{FB7712AD-3B21-4FE9-B722-CF9B0200D9B9}" type="datetimeFigureOut">
               <a:rPr lang="en-US" smtClean="0"/>
-              <a:t>8/24/2017</a:t>
+              <a:t>9/5/2017</a:t>
             </a:fld>
             <a:endParaRPr lang="en-US"/>
           </a:p>
@@ -2440,7 +2440,7 @@
           <a:p>
             <a:fld id="{FB7712AD-3B21-4FE9-B722-CF9B0200D9B9}" type="datetimeFigureOut">
               <a:rPr lang="en-US" smtClean="0"/>
-              <a:t>8/24/2017</a:t>
+              <a:t>9/5/2017</a:t>
             </a:fld>
             <a:endParaRPr lang="en-US"/>
           </a:p>
@@ -2727,7 +2727,7 @@
           <a:p>
             <a:fld id="{FB7712AD-3B21-4FE9-B722-CF9B0200D9B9}" type="datetimeFigureOut">
               <a:rPr lang="en-US" smtClean="0"/>
-              <a:t>8/24/2017</a:t>
+              <a:t>9/5/2017</a:t>
             </a:fld>
             <a:endParaRPr lang="en-US"/>
           </a:p>
@@ -2994,7 +2994,7 @@
           <a:p>
             <a:fld id="{FB7712AD-3B21-4FE9-B722-CF9B0200D9B9}" type="datetimeFigureOut">
               <a:rPr lang="en-US" smtClean="0"/>
-              <a:t>8/24/2017</a:t>
+              <a:t>9/5/2017</a:t>
             </a:fld>
             <a:endParaRPr lang="en-US"/>
           </a:p>
@@ -3320,7 +3320,7 @@
           <a:p>
             <a:fld id="{FB7712AD-3B21-4FE9-B722-CF9B0200D9B9}" type="datetimeFigureOut">
               <a:rPr lang="en-US" smtClean="0"/>
-              <a:t>8/24/2017</a:t>
+              <a:t>9/5/2017</a:t>
             </a:fld>
             <a:endParaRPr lang="en-US"/>
           </a:p>
@@ -3887,76 +3887,6 @@
             <a:r>
               <a:rPr lang="en-US" sz="4000" dirty="0"/>
               <a:t>HTML5</a:t>
-            </a:r>
-          </a:p>
-        </p:txBody>
-      </p:sp>
-      <p:sp>
-        <p:nvSpPr>
-          <p:cNvPr id="3" name="Subtitle 2"/>
-          <p:cNvSpPr>
-            <a:spLocks noGrp="1"/>
-          </p:cNvSpPr>
-          <p:nvPr>
-            <p:ph type="subTitle" idx="1"/>
-          </p:nvPr>
-        </p:nvSpPr>
-        <p:spPr/>
-        <p:txBody>
-          <a:bodyPr/>
-          <a:lstStyle/>
-          <a:p>
-            <a:r>
-              <a:rPr lang="en-US" dirty="0" err="1">
-                <a:solidFill>
-                  <a:schemeClr val="bg1">
-                    <a:lumMod val="50000"/>
-                  </a:schemeClr>
-                </a:solidFill>
-              </a:rPr>
-              <a:t>Piotr</a:t>
-            </a:r>
-            <a:r>
-              <a:rPr lang="en-US" dirty="0">
-                <a:solidFill>
-                  <a:schemeClr val="bg1">
-                    <a:lumMod val="50000"/>
-                  </a:schemeClr>
-                </a:solidFill>
-              </a:rPr>
-              <a:t> </a:t>
-            </a:r>
-            <a:r>
-              <a:rPr lang="en-US" dirty="0" err="1">
-                <a:solidFill>
-                  <a:schemeClr val="bg1">
-                    <a:lumMod val="50000"/>
-                  </a:schemeClr>
-                </a:solidFill>
-              </a:rPr>
-              <a:t>Szczurek</a:t>
-            </a:r>
-            <a:r>
-              <a:rPr lang="en-US" dirty="0">
-                <a:solidFill>
-                  <a:schemeClr val="bg1">
-                    <a:lumMod val="50000"/>
-                  </a:schemeClr>
-                </a:solidFill>
-              </a:rPr>
-              <a:t>, Ph.D.</a:t>
-            </a:r>
-          </a:p>
-          <a:p>
-            <a:r>
-              <a:rPr lang="en-US" dirty="0">
-                <a:solidFill>
-                  <a:schemeClr val="bg1">
-                    <a:lumMod val="50000"/>
-                  </a:schemeClr>
-                </a:solidFill>
-              </a:rPr>
-              <a:t>Lewis University</a:t>
             </a:r>
           </a:p>
         </p:txBody>
@@ -7245,7 +7175,7 @@
           <a:graphicData uri="http://schemas.openxmlformats.org/presentationml/2006/ole">
             <mc:AlternateContent xmlns:mc="http://schemas.openxmlformats.org/markup-compatibility/2006">
               <mc:Choice xmlns:v="urn:schemas-microsoft-com:vml" Requires="v">
-                <p:oleObj spid="_x0000_s1325" name="Document" r:id="rId3" imgW="5477256" imgH="2514600" progId="Word.Document.8">
+                <p:oleObj spid="_x0000_s1327" name="Document" r:id="rId3" imgW="5477256" imgH="2514600" progId="Word.Document.8">
                   <p:embed/>
                 </p:oleObj>
               </mc:Choice>

</xml_diff>

<commit_message>
Update index.html, HTML5, and session-04 documents.
</commit_message>
<xml_diff>
--- a/CPSC-24700/Presentations/HTML5.pptx
+++ b/CPSC-24700/Presentations/HTML5.pptx
@@ -279,7 +279,7 @@
           <a:p>
             <a:fld id="{82AC26F5-A2E7-4901-A403-BBD25C17198C}" type="datetimeFigureOut">
               <a:rPr lang="en-US" smtClean="0"/>
-              <a:t>9/5/2017</a:t>
+              <a:t>9/6/2017</a:t>
             </a:fld>
             <a:endParaRPr lang="en-US"/>
           </a:p>
@@ -546,6 +546,174 @@
 </p:notesMaster>
 </file>
 
+<file path=ppt/notesSlides/notesSlide1.xml><?xml version="1.0" encoding="utf-8"?>
+<p:notes xmlns:a="http://schemas.openxmlformats.org/drawingml/2006/main" xmlns:r="http://schemas.openxmlformats.org/officeDocument/2006/relationships" xmlns:p="http://schemas.openxmlformats.org/presentationml/2006/main">
+  <p:cSld>
+    <p:spTree>
+      <p:nvGrpSpPr>
+        <p:cNvPr id="1" name=""/>
+        <p:cNvGrpSpPr/>
+        <p:nvPr/>
+      </p:nvGrpSpPr>
+      <p:grpSpPr>
+        <a:xfrm>
+          <a:off x="0" y="0"/>
+          <a:ext cx="0" cy="0"/>
+          <a:chOff x="0" y="0"/>
+          <a:chExt cx="0" cy="0"/>
+        </a:xfrm>
+      </p:grpSpPr>
+      <p:sp>
+        <p:nvSpPr>
+          <p:cNvPr id="2" name="Slide Image Placeholder 1"/>
+          <p:cNvSpPr>
+            <a:spLocks noGrp="1" noRot="1" noChangeAspect="1"/>
+          </p:cNvSpPr>
+          <p:nvPr>
+            <p:ph type="sldImg"/>
+          </p:nvPr>
+        </p:nvSpPr>
+        <p:spPr/>
+      </p:sp>
+      <p:sp>
+        <p:nvSpPr>
+          <p:cNvPr id="3" name="Notes Placeholder 2"/>
+          <p:cNvSpPr>
+            <a:spLocks noGrp="1"/>
+          </p:cNvSpPr>
+          <p:nvPr>
+            <p:ph type="body" idx="1"/>
+          </p:nvPr>
+        </p:nvSpPr>
+        <p:spPr/>
+        <p:txBody>
+          <a:bodyPr/>
+          <a:lstStyle/>
+          <a:p>
+            <a:endParaRPr lang="en-US" dirty="0"/>
+          </a:p>
+        </p:txBody>
+      </p:sp>
+      <p:sp>
+        <p:nvSpPr>
+          <p:cNvPr id="4" name="Slide Number Placeholder 3"/>
+          <p:cNvSpPr>
+            <a:spLocks noGrp="1"/>
+          </p:cNvSpPr>
+          <p:nvPr>
+            <p:ph type="sldNum" sz="quarter" idx="10"/>
+          </p:nvPr>
+        </p:nvSpPr>
+        <p:spPr/>
+        <p:txBody>
+          <a:bodyPr/>
+          <a:lstStyle/>
+          <a:p>
+            <a:fld id="{40F5A9F4-14AB-4E34-9372-28158D5523BB}" type="slidenum">
+              <a:rPr lang="en-US" smtClean="0"/>
+              <a:t>6</a:t>
+            </a:fld>
+            <a:endParaRPr lang="en-US"/>
+          </a:p>
+        </p:txBody>
+      </p:sp>
+    </p:spTree>
+    <p:extLst>
+      <p:ext uri="{BB962C8B-B14F-4D97-AF65-F5344CB8AC3E}">
+        <p14:creationId xmlns:p14="http://schemas.microsoft.com/office/powerpoint/2010/main" val="983967563"/>
+      </p:ext>
+    </p:extLst>
+  </p:cSld>
+  <p:clrMapOvr>
+    <a:masterClrMapping/>
+  </p:clrMapOvr>
+</p:notes>
+</file>
+
+<file path=ppt/notesSlides/notesSlide2.xml><?xml version="1.0" encoding="utf-8"?>
+<p:notes xmlns:a="http://schemas.openxmlformats.org/drawingml/2006/main" xmlns:r="http://schemas.openxmlformats.org/officeDocument/2006/relationships" xmlns:p="http://schemas.openxmlformats.org/presentationml/2006/main">
+  <p:cSld>
+    <p:spTree>
+      <p:nvGrpSpPr>
+        <p:cNvPr id="1" name=""/>
+        <p:cNvGrpSpPr/>
+        <p:nvPr/>
+      </p:nvGrpSpPr>
+      <p:grpSpPr>
+        <a:xfrm>
+          <a:off x="0" y="0"/>
+          <a:ext cx="0" cy="0"/>
+          <a:chOff x="0" y="0"/>
+          <a:chExt cx="0" cy="0"/>
+        </a:xfrm>
+      </p:grpSpPr>
+      <p:sp>
+        <p:nvSpPr>
+          <p:cNvPr id="2" name="Slide Image Placeholder 1"/>
+          <p:cNvSpPr>
+            <a:spLocks noGrp="1" noRot="1" noChangeAspect="1"/>
+          </p:cNvSpPr>
+          <p:nvPr>
+            <p:ph type="sldImg"/>
+          </p:nvPr>
+        </p:nvSpPr>
+        <p:spPr/>
+      </p:sp>
+      <p:sp>
+        <p:nvSpPr>
+          <p:cNvPr id="3" name="Notes Placeholder 2"/>
+          <p:cNvSpPr>
+            <a:spLocks noGrp="1"/>
+          </p:cNvSpPr>
+          <p:nvPr>
+            <p:ph type="body" idx="1"/>
+          </p:nvPr>
+        </p:nvSpPr>
+        <p:spPr/>
+        <p:txBody>
+          <a:bodyPr/>
+          <a:lstStyle/>
+          <a:p>
+            <a:endParaRPr lang="en-US" dirty="0"/>
+          </a:p>
+        </p:txBody>
+      </p:sp>
+      <p:sp>
+        <p:nvSpPr>
+          <p:cNvPr id="4" name="Slide Number Placeholder 3"/>
+          <p:cNvSpPr>
+            <a:spLocks noGrp="1"/>
+          </p:cNvSpPr>
+          <p:nvPr>
+            <p:ph type="sldNum" sz="quarter" idx="10"/>
+          </p:nvPr>
+        </p:nvSpPr>
+        <p:spPr/>
+        <p:txBody>
+          <a:bodyPr/>
+          <a:lstStyle/>
+          <a:p>
+            <a:fld id="{40F5A9F4-14AB-4E34-9372-28158D5523BB}" type="slidenum">
+              <a:rPr lang="en-US" smtClean="0"/>
+              <a:t>22</a:t>
+            </a:fld>
+            <a:endParaRPr lang="en-US"/>
+          </a:p>
+        </p:txBody>
+      </p:sp>
+    </p:spTree>
+    <p:extLst>
+      <p:ext uri="{BB962C8B-B14F-4D97-AF65-F5344CB8AC3E}">
+        <p14:creationId xmlns:p14="http://schemas.microsoft.com/office/powerpoint/2010/main" val="3904271352"/>
+      </p:ext>
+    </p:extLst>
+  </p:cSld>
+  <p:clrMapOvr>
+    <a:masterClrMapping/>
+  </p:clrMapOvr>
+</p:notes>
+</file>
+
 <file path=ppt/slideLayouts/slideLayout1.xml><?xml version="1.0" encoding="utf-8"?>
 <p:sldLayout xmlns:a="http://schemas.openxmlformats.org/drawingml/2006/main" xmlns:r="http://schemas.openxmlformats.org/officeDocument/2006/relationships" xmlns:p="http://schemas.openxmlformats.org/presentationml/2006/main" type="title" preserve="1">
   <p:cSld name="Title Slide">
@@ -675,7 +843,7 @@
           <a:p>
             <a:fld id="{FB7712AD-3B21-4FE9-B722-CF9B0200D9B9}" type="datetimeFigureOut">
               <a:rPr lang="en-US" smtClean="0"/>
-              <a:t>9/5/2017</a:t>
+              <a:t>9/6/2017</a:t>
             </a:fld>
             <a:endParaRPr lang="en-US"/>
           </a:p>
@@ -855,7 +1023,7 @@
           <a:p>
             <a:fld id="{FB7712AD-3B21-4FE9-B722-CF9B0200D9B9}" type="datetimeFigureOut">
               <a:rPr lang="en-US" smtClean="0"/>
-              <a:t>9/5/2017</a:t>
+              <a:t>9/6/2017</a:t>
             </a:fld>
             <a:endParaRPr lang="en-US"/>
           </a:p>
@@ -1045,7 +1213,7 @@
           <a:p>
             <a:fld id="{FB7712AD-3B21-4FE9-B722-CF9B0200D9B9}" type="datetimeFigureOut">
               <a:rPr lang="en-US" smtClean="0"/>
-              <a:t>9/5/2017</a:t>
+              <a:t>9/6/2017</a:t>
             </a:fld>
             <a:endParaRPr lang="en-US"/>
           </a:p>
@@ -1268,7 +1436,7 @@
           <a:p>
             <a:fld id="{FB7712AD-3B21-4FE9-B722-CF9B0200D9B9}" type="datetimeFigureOut">
               <a:rPr lang="en-US" smtClean="0"/>
-              <a:t>9/5/2017</a:t>
+              <a:t>9/6/2017</a:t>
             </a:fld>
             <a:endParaRPr lang="en-US"/>
           </a:p>
@@ -1471,7 +1639,7 @@
           <a:p>
             <a:fld id="{FB7712AD-3B21-4FE9-B722-CF9B0200D9B9}" type="datetimeFigureOut">
               <a:rPr lang="en-US" smtClean="0"/>
-              <a:t>9/5/2017</a:t>
+              <a:t>9/6/2017</a:t>
             </a:fld>
             <a:endParaRPr lang="en-US"/>
           </a:p>
@@ -1768,7 +1936,7 @@
           <a:p>
             <a:fld id="{FB7712AD-3B21-4FE9-B722-CF9B0200D9B9}" type="datetimeFigureOut">
               <a:rPr lang="en-US" smtClean="0"/>
-              <a:t>9/5/2017</a:t>
+              <a:t>9/6/2017</a:t>
             </a:fld>
             <a:endParaRPr lang="en-US"/>
           </a:p>
@@ -2204,7 +2372,7 @@
           <a:p>
             <a:fld id="{FB7712AD-3B21-4FE9-B722-CF9B0200D9B9}" type="datetimeFigureOut">
               <a:rPr lang="en-US" smtClean="0"/>
-              <a:t>9/5/2017</a:t>
+              <a:t>9/6/2017</a:t>
             </a:fld>
             <a:endParaRPr lang="en-US"/>
           </a:p>
@@ -2333,7 +2501,7 @@
           <a:p>
             <a:fld id="{FB7712AD-3B21-4FE9-B722-CF9B0200D9B9}" type="datetimeFigureOut">
               <a:rPr lang="en-US" smtClean="0"/>
-              <a:t>9/5/2017</a:t>
+              <a:t>9/6/2017</a:t>
             </a:fld>
             <a:endParaRPr lang="en-US"/>
           </a:p>
@@ -2440,7 +2608,7 @@
           <a:p>
             <a:fld id="{FB7712AD-3B21-4FE9-B722-CF9B0200D9B9}" type="datetimeFigureOut">
               <a:rPr lang="en-US" smtClean="0"/>
-              <a:t>9/5/2017</a:t>
+              <a:t>9/6/2017</a:t>
             </a:fld>
             <a:endParaRPr lang="en-US"/>
           </a:p>
@@ -2727,7 +2895,7 @@
           <a:p>
             <a:fld id="{FB7712AD-3B21-4FE9-B722-CF9B0200D9B9}" type="datetimeFigureOut">
               <a:rPr lang="en-US" smtClean="0"/>
-              <a:t>9/5/2017</a:t>
+              <a:t>9/6/2017</a:t>
             </a:fld>
             <a:endParaRPr lang="en-US"/>
           </a:p>
@@ -2994,7 +3162,7 @@
           <a:p>
             <a:fld id="{FB7712AD-3B21-4FE9-B722-CF9B0200D9B9}" type="datetimeFigureOut">
               <a:rPr lang="en-US" smtClean="0"/>
-              <a:t>9/5/2017</a:t>
+              <a:t>9/6/2017</a:t>
             </a:fld>
             <a:endParaRPr lang="en-US"/>
           </a:p>
@@ -3320,7 +3488,7 @@
           <a:p>
             <a:fld id="{FB7712AD-3B21-4FE9-B722-CF9B0200D9B9}" type="datetimeFigureOut">
               <a:rPr lang="en-US" smtClean="0"/>
-              <a:t>9/5/2017</a:t>
+              <a:t>9/6/2017</a:t>
             </a:fld>
             <a:endParaRPr lang="en-US"/>
           </a:p>
@@ -7175,7 +7343,7 @@
           <a:graphicData uri="http://schemas.openxmlformats.org/presentationml/2006/ole">
             <mc:AlternateContent xmlns:mc="http://schemas.openxmlformats.org/markup-compatibility/2006">
               <mc:Choice xmlns:v="urn:schemas-microsoft-com:vml" Requires="v">
-                <p:oleObj spid="_x0000_s1327" name="Document" r:id="rId3" imgW="5477256" imgH="2514600" progId="Word.Document.8">
+                <p:oleObj spid="_x0000_s1329" name="Document" r:id="rId3" imgW="5477256" imgH="2514600" progId="Word.Document.8">
                   <p:embed/>
                 </p:oleObj>
               </mc:Choice>
@@ -24418,13 +24586,15 @@
       <p:cxnSp>
         <p:nvCxnSpPr>
           <p:cNvPr id="14" name="Straight Arrow Connector 13"/>
-          <p:cNvCxnSpPr/>
+          <p:cNvCxnSpPr>
+            <a:cxnSpLocks/>
+          </p:cNvCxnSpPr>
           <p:nvPr/>
         </p:nvCxnSpPr>
         <p:spPr>
           <a:xfrm flipV="1">
-            <a:off x="4065690" y="4495800"/>
-            <a:ext cx="228600" cy="533400"/>
+            <a:off x="3200400" y="4343400"/>
+            <a:ext cx="827325" cy="571596"/>
           </a:xfrm>
           <a:prstGeom prst="straightConnector1">
             <a:avLst/>
@@ -24459,7 +24629,7 @@
         </p:nvSpPr>
         <p:spPr>
           <a:xfrm>
-            <a:off x="3220257" y="5042010"/>
+            <a:off x="2278889" y="4819072"/>
             <a:ext cx="1436034" cy="369332"/>
           </a:xfrm>
           <a:prstGeom prst="rect">
@@ -24476,6 +24646,96 @@
             <a:r>
               <a:rPr lang="en-US" dirty="0"/>
               <a:t>Void element</a:t>
+            </a:r>
+          </a:p>
+        </p:txBody>
+      </p:sp>
+      <p:sp>
+        <p:nvSpPr>
+          <p:cNvPr id="7" name="Rectangle 6">
+            <a:extLst>
+              <a:ext uri="{FF2B5EF4-FFF2-40B4-BE49-F238E27FC236}">
+                <a16:creationId xmlns:a16="http://schemas.microsoft.com/office/drawing/2014/main" id="{FF1AD049-1635-4843-AAFC-C7FE4B9C5DC4}"/>
+              </a:ext>
+            </a:extLst>
+          </p:cNvPr>
+          <p:cNvSpPr/>
+          <p:nvPr/>
+        </p:nvSpPr>
+        <p:spPr>
+          <a:xfrm>
+            <a:off x="4114800" y="5029200"/>
+            <a:ext cx="4953000" cy="1754326"/>
+          </a:xfrm>
+          <a:prstGeom prst="rect">
+            <a:avLst/>
+          </a:prstGeom>
+          <a:ln w="25400">
+            <a:solidFill>
+              <a:schemeClr val="tx1"/>
+            </a:solidFill>
+          </a:ln>
+        </p:spPr>
+        <p:txBody>
+          <a:bodyPr wrap="square">
+            <a:spAutoFit/>
+          </a:bodyPr>
+          <a:lstStyle/>
+          <a:p>
+            <a:r>
+              <a:rPr lang="en-US" u="sng" dirty="0"/>
+              <a:t>XHTML vs HTML5:</a:t>
+            </a:r>
+          </a:p>
+          <a:p>
+            <a:r>
+              <a:rPr lang="en-US" dirty="0"/>
+              <a:t>XHTML required &lt;</a:t>
+            </a:r>
+            <a:r>
+              <a:rPr lang="en-US" dirty="0" err="1"/>
+              <a:t>br</a:t>
+            </a:r>
+            <a:r>
+              <a:rPr lang="en-US" dirty="0"/>
+              <a:t> /&gt;</a:t>
+            </a:r>
+          </a:p>
+          <a:p>
+            <a:r>
+              <a:rPr lang="en-US" dirty="0"/>
+              <a:t>HTML5 recommends &lt;</a:t>
+            </a:r>
+            <a:r>
+              <a:rPr lang="en-US" dirty="0" err="1"/>
+              <a:t>br</a:t>
+            </a:r>
+            <a:r>
+              <a:rPr lang="en-US" dirty="0"/>
+              <a:t>&gt; but support  either</a:t>
+            </a:r>
+          </a:p>
+          <a:p>
+            <a:endParaRPr lang="en-US" dirty="0"/>
+          </a:p>
+          <a:p>
+            <a:r>
+              <a:rPr lang="en-US" dirty="0"/>
+              <a:t>We will utilize &lt;</a:t>
+            </a:r>
+            <a:r>
+              <a:rPr lang="en-US" dirty="0" err="1"/>
+              <a:t>br</a:t>
+            </a:r>
+            <a:r>
+              <a:rPr lang="en-US" dirty="0"/>
+              <a:t>&gt; in our labs and assignments</a:t>
+            </a:r>
+          </a:p>
+          <a:p>
+            <a:r>
+              <a:rPr lang="en-US" dirty="0"/>
+              <a:t> </a:t>
             </a:r>
           </a:p>
         </p:txBody>
@@ -24835,6 +25095,59 @@
                       </p:childTnLst>
                     </p:cTn>
                   </p:par>
+                  <p:par>
+                    <p:cTn id="31" fill="hold">
+                      <p:stCondLst>
+                        <p:cond delay="indefinite"/>
+                      </p:stCondLst>
+                      <p:childTnLst>
+                        <p:par>
+                          <p:cTn id="32" fill="hold">
+                            <p:stCondLst>
+                              <p:cond delay="0"/>
+                            </p:stCondLst>
+                            <p:childTnLst>
+                              <p:par>
+                                <p:cTn id="33" presetID="10" presetClass="entr" presetSubtype="0" fill="hold" grpId="0" nodeType="clickEffect">
+                                  <p:stCondLst>
+                                    <p:cond delay="0"/>
+                                  </p:stCondLst>
+                                  <p:childTnLst>
+                                    <p:set>
+                                      <p:cBhvr>
+                                        <p:cTn id="34" dur="1" fill="hold">
+                                          <p:stCondLst>
+                                            <p:cond delay="0"/>
+                                          </p:stCondLst>
+                                        </p:cTn>
+                                        <p:tgtEl>
+                                          <p:spTgt spid="7"/>
+                                        </p:tgtEl>
+                                        <p:attrNameLst>
+                                          <p:attrName>style.visibility</p:attrName>
+                                        </p:attrNameLst>
+                                      </p:cBhvr>
+                                      <p:to>
+                                        <p:strVal val="visible"/>
+                                      </p:to>
+                                    </p:set>
+                                    <p:animEffect transition="in" filter="fade">
+                                      <p:cBhvr>
+                                        <p:cTn id="35" dur="500"/>
+                                        <p:tgtEl>
+                                          <p:spTgt spid="7"/>
+                                        </p:tgtEl>
+                                      </p:cBhvr>
+                                    </p:animEffect>
+                                  </p:childTnLst>
+                                </p:cTn>
+                              </p:par>
+                            </p:childTnLst>
+                          </p:cTn>
+                        </p:par>
+                      </p:childTnLst>
+                    </p:cTn>
+                  </p:par>
                 </p:childTnLst>
               </p:cTn>
               <p:prevCondLst>
@@ -24862,6 +25175,7 @@
       <p:bldP spid="12" grpId="0" animBg="1"/>
       <p:bldP spid="13" grpId="0"/>
       <p:bldP spid="15" grpId="0"/>
+      <p:bldP spid="7" grpId="0" animBg="1"/>
     </p:bldLst>
   </p:timing>
 </p:sld>
@@ -29664,7 +29978,7 @@
             </a:pPr>
             <a:r>
               <a:rPr lang="en-US" dirty="0"/>
-              <a:t>Indent (tab or 2 or 4 spaces) each nested element</a:t>
+              <a:t>Consistently indent (tab or 2 or 4 spaces) each nested element</a:t>
             </a:r>
           </a:p>
           <a:p>

</xml_diff>

<commit_message>
Add session 5 documents and update HTML presentation.
</commit_message>
<xml_diff>
--- a/CPSC-24700/Presentations/HTML5.pptx
+++ b/CPSC-24700/Presentations/HTML5.pptx
@@ -279,7 +279,7 @@
           <a:p>
             <a:fld id="{82AC26F5-A2E7-4901-A403-BBD25C17198C}" type="datetimeFigureOut">
               <a:rPr lang="en-US" smtClean="0"/>
-              <a:t>9/6/2017</a:t>
+              <a:t>9/7/2017</a:t>
             </a:fld>
             <a:endParaRPr lang="en-US"/>
           </a:p>
@@ -970,6 +970,840 @@
 </p:notes>
 </file>
 
+<file path=ppt/notesSlides/notesSlide5.xml><?xml version="1.0" encoding="utf-8"?>
+<p:notes xmlns:a="http://schemas.openxmlformats.org/drawingml/2006/main" xmlns:r="http://schemas.openxmlformats.org/officeDocument/2006/relationships" xmlns:p="http://schemas.openxmlformats.org/presentationml/2006/main">
+  <p:cSld>
+    <p:spTree>
+      <p:nvGrpSpPr>
+        <p:cNvPr id="1" name=""/>
+        <p:cNvGrpSpPr/>
+        <p:nvPr/>
+      </p:nvGrpSpPr>
+      <p:grpSpPr>
+        <a:xfrm>
+          <a:off x="0" y="0"/>
+          <a:ext cx="0" cy="0"/>
+          <a:chOff x="0" y="0"/>
+          <a:chExt cx="0" cy="0"/>
+        </a:xfrm>
+      </p:grpSpPr>
+      <p:sp>
+        <p:nvSpPr>
+          <p:cNvPr id="2" name="Slide Image Placeholder 1"/>
+          <p:cNvSpPr>
+            <a:spLocks noGrp="1" noRot="1" noChangeAspect="1"/>
+          </p:cNvSpPr>
+          <p:nvPr>
+            <p:ph type="sldImg"/>
+          </p:nvPr>
+        </p:nvSpPr>
+        <p:spPr/>
+      </p:sp>
+      <p:sp>
+        <p:nvSpPr>
+          <p:cNvPr id="3" name="Notes Placeholder 2"/>
+          <p:cNvSpPr>
+            <a:spLocks noGrp="1"/>
+          </p:cNvSpPr>
+          <p:nvPr>
+            <p:ph type="body" idx="1"/>
+          </p:nvPr>
+        </p:nvSpPr>
+        <p:spPr/>
+        <p:txBody>
+          <a:bodyPr/>
+          <a:lstStyle/>
+          <a:p>
+            <a:r>
+              <a:rPr lang="en-US" dirty="0"/>
+              <a:t>Links:</a:t>
+            </a:r>
+          </a:p>
+          <a:p>
+            <a:r>
+              <a:rPr lang="en-US" dirty="0"/>
+              <a:t>http://www.epogue.info/cpsc-24700/Presentations/examples/w8code2/ordered.html</a:t>
+            </a:r>
+          </a:p>
+          <a:p>
+            <a:pPr marL="0" marR="0" lvl="0" indent="0" algn="l" defTabSz="914400" rtl="0" eaLnBrk="1" fontAlgn="auto" latinLnBrk="0" hangingPunct="1">
+              <a:lnSpc>
+                <a:spcPct val="100000"/>
+              </a:lnSpc>
+              <a:spcBef>
+                <a:spcPts val="0"/>
+              </a:spcBef>
+              <a:spcAft>
+                <a:spcPts val="0"/>
+              </a:spcAft>
+              <a:buClrTx/>
+              <a:buSzTx/>
+              <a:buFontTx/>
+              <a:buNone/>
+              <a:tabLst/>
+              <a:defRPr/>
+            </a:pPr>
+            <a:r>
+              <a:rPr lang="en-US" dirty="0"/>
+              <a:t>http://www.epogue.info/cpsc-24700/Presentations/examples/w8code2/unordered.html</a:t>
+            </a:r>
+          </a:p>
+          <a:p>
+            <a:pPr marL="0" marR="0" lvl="0" indent="0" algn="l" defTabSz="914400" rtl="0" eaLnBrk="1" fontAlgn="auto" latinLnBrk="0" hangingPunct="1">
+              <a:lnSpc>
+                <a:spcPct val="100000"/>
+              </a:lnSpc>
+              <a:spcBef>
+                <a:spcPts val="0"/>
+              </a:spcBef>
+              <a:spcAft>
+                <a:spcPts val="0"/>
+              </a:spcAft>
+              <a:buClrTx/>
+              <a:buSzTx/>
+              <a:buFontTx/>
+              <a:buNone/>
+              <a:tabLst/>
+              <a:defRPr/>
+            </a:pPr>
+            <a:r>
+              <a:rPr lang="en-US" dirty="0"/>
+              <a:t>http://www.epogue.info/cpsc-24700/Presentations/examples/w8code2/definition.html</a:t>
+            </a:r>
+          </a:p>
+          <a:p>
+            <a:pPr marL="0" marR="0" lvl="0" indent="0" algn="l" defTabSz="914400" rtl="0" eaLnBrk="1" fontAlgn="auto" latinLnBrk="0" hangingPunct="1">
+              <a:lnSpc>
+                <a:spcPct val="100000"/>
+              </a:lnSpc>
+              <a:spcBef>
+                <a:spcPts val="0"/>
+              </a:spcBef>
+              <a:spcAft>
+                <a:spcPts val="0"/>
+              </a:spcAft>
+              <a:buClrTx/>
+              <a:buSzTx/>
+              <a:buFontTx/>
+              <a:buNone/>
+              <a:tabLst/>
+              <a:defRPr/>
+            </a:pPr>
+            <a:r>
+              <a:rPr lang="en-US" dirty="0"/>
+              <a:t>http://www.epogue.info/cpsc-24700/Presentations/examples/w8code2/</a:t>
+            </a:r>
+            <a:r>
+              <a:rPr lang="en-US" dirty="0">
+                <a:cs typeface="Calibri" panose="020F0502020204030204" pitchFamily="34" charset="0"/>
+              </a:rPr>
+              <a:t>nested_lists.html </a:t>
+            </a:r>
+            <a:endParaRPr lang="en-US" dirty="0"/>
+          </a:p>
+          <a:p>
+            <a:pPr marL="0" marR="0" lvl="0" indent="0" algn="l" defTabSz="914400" rtl="0" eaLnBrk="1" fontAlgn="auto" latinLnBrk="0" hangingPunct="1">
+              <a:lnSpc>
+                <a:spcPct val="100000"/>
+              </a:lnSpc>
+              <a:spcBef>
+                <a:spcPts val="0"/>
+              </a:spcBef>
+              <a:spcAft>
+                <a:spcPts val="0"/>
+              </a:spcAft>
+              <a:buClrTx/>
+              <a:buSzTx/>
+              <a:buFontTx/>
+              <a:buNone/>
+              <a:tabLst/>
+              <a:defRPr/>
+            </a:pPr>
+            <a:endParaRPr lang="en-US" dirty="0"/>
+          </a:p>
+          <a:p>
+            <a:pPr marL="0" marR="0" lvl="0" indent="0" algn="l" defTabSz="914400" rtl="0" eaLnBrk="1" fontAlgn="auto" latinLnBrk="0" hangingPunct="1">
+              <a:lnSpc>
+                <a:spcPct val="100000"/>
+              </a:lnSpc>
+              <a:spcBef>
+                <a:spcPts val="0"/>
+              </a:spcBef>
+              <a:spcAft>
+                <a:spcPts val="0"/>
+              </a:spcAft>
+              <a:buClrTx/>
+              <a:buSzTx/>
+              <a:buFontTx/>
+              <a:buNone/>
+              <a:tabLst/>
+              <a:defRPr/>
+            </a:pPr>
+            <a:endParaRPr lang="en-US" dirty="0"/>
+          </a:p>
+          <a:p>
+            <a:endParaRPr lang="en-US" dirty="0"/>
+          </a:p>
+          <a:p>
+            <a:endParaRPr lang="en-US" dirty="0"/>
+          </a:p>
+        </p:txBody>
+      </p:sp>
+      <p:sp>
+        <p:nvSpPr>
+          <p:cNvPr id="4" name="Slide Number Placeholder 3"/>
+          <p:cNvSpPr>
+            <a:spLocks noGrp="1"/>
+          </p:cNvSpPr>
+          <p:nvPr>
+            <p:ph type="sldNum" sz="quarter" idx="10"/>
+          </p:nvPr>
+        </p:nvSpPr>
+        <p:spPr/>
+        <p:txBody>
+          <a:bodyPr/>
+          <a:lstStyle/>
+          <a:p>
+            <a:fld id="{40F5A9F4-14AB-4E34-9372-28158D5523BB}" type="slidenum">
+              <a:rPr lang="en-US" smtClean="0"/>
+              <a:t>35</a:t>
+            </a:fld>
+            <a:endParaRPr lang="en-US"/>
+          </a:p>
+        </p:txBody>
+      </p:sp>
+    </p:spTree>
+    <p:extLst>
+      <p:ext uri="{BB962C8B-B14F-4D97-AF65-F5344CB8AC3E}">
+        <p14:creationId xmlns:p14="http://schemas.microsoft.com/office/powerpoint/2010/main" val="3129592957"/>
+      </p:ext>
+    </p:extLst>
+  </p:cSld>
+  <p:clrMapOvr>
+    <a:masterClrMapping/>
+  </p:clrMapOvr>
+</p:notes>
+</file>
+
+<file path=ppt/notesSlides/notesSlide6.xml><?xml version="1.0" encoding="utf-8"?>
+<p:notes xmlns:a="http://schemas.openxmlformats.org/drawingml/2006/main" xmlns:r="http://schemas.openxmlformats.org/officeDocument/2006/relationships" xmlns:p="http://schemas.openxmlformats.org/presentationml/2006/main">
+  <p:cSld>
+    <p:spTree>
+      <p:nvGrpSpPr>
+        <p:cNvPr id="1" name=""/>
+        <p:cNvGrpSpPr/>
+        <p:nvPr/>
+      </p:nvGrpSpPr>
+      <p:grpSpPr>
+        <a:xfrm>
+          <a:off x="0" y="0"/>
+          <a:ext cx="0" cy="0"/>
+          <a:chOff x="0" y="0"/>
+          <a:chExt cx="0" cy="0"/>
+        </a:xfrm>
+      </p:grpSpPr>
+      <p:sp>
+        <p:nvSpPr>
+          <p:cNvPr id="2" name="Slide Image Placeholder 1"/>
+          <p:cNvSpPr>
+            <a:spLocks noGrp="1" noRot="1" noChangeAspect="1"/>
+          </p:cNvSpPr>
+          <p:nvPr>
+            <p:ph type="sldImg"/>
+          </p:nvPr>
+        </p:nvSpPr>
+        <p:spPr/>
+      </p:sp>
+      <p:sp>
+        <p:nvSpPr>
+          <p:cNvPr id="3" name="Notes Placeholder 2"/>
+          <p:cNvSpPr>
+            <a:spLocks noGrp="1"/>
+          </p:cNvSpPr>
+          <p:nvPr>
+            <p:ph type="body" idx="1"/>
+          </p:nvPr>
+        </p:nvSpPr>
+        <p:spPr/>
+        <p:txBody>
+          <a:bodyPr/>
+          <a:lstStyle/>
+          <a:p>
+            <a:r>
+              <a:rPr lang="en-US" dirty="0"/>
+              <a:t>Links:</a:t>
+            </a:r>
+          </a:p>
+          <a:p>
+            <a:pPr marL="0" marR="0" lvl="0" indent="0" algn="l" defTabSz="914400" rtl="0" eaLnBrk="1" fontAlgn="auto" latinLnBrk="0" hangingPunct="1">
+              <a:lnSpc>
+                <a:spcPct val="100000"/>
+              </a:lnSpc>
+              <a:spcBef>
+                <a:spcPts val="0"/>
+              </a:spcBef>
+              <a:spcAft>
+                <a:spcPts val="0"/>
+              </a:spcAft>
+              <a:buClrTx/>
+              <a:buSzTx/>
+              <a:buFontTx/>
+              <a:buNone/>
+              <a:tabLst/>
+              <a:defRPr/>
+            </a:pPr>
+            <a:r>
+              <a:rPr lang="en-US" dirty="0"/>
+              <a:t>http://www.epogue.info/cpsc-24700/Presentations/examples/w8code2/</a:t>
+            </a:r>
+            <a:r>
+              <a:rPr lang="en-US" dirty="0">
+                <a:cs typeface="Calibri" panose="020F0502020204030204" pitchFamily="34" charset="0"/>
+              </a:rPr>
+              <a:t>table.html </a:t>
+            </a:r>
+          </a:p>
+          <a:p>
+            <a:pPr marL="0" marR="0" lvl="0" indent="0" algn="l" defTabSz="914400" rtl="0" eaLnBrk="1" fontAlgn="auto" latinLnBrk="0" hangingPunct="1">
+              <a:lnSpc>
+                <a:spcPct val="100000"/>
+              </a:lnSpc>
+              <a:spcBef>
+                <a:spcPts val="0"/>
+              </a:spcBef>
+              <a:spcAft>
+                <a:spcPts val="0"/>
+              </a:spcAft>
+              <a:buClrTx/>
+              <a:buSzTx/>
+              <a:buFontTx/>
+              <a:buNone/>
+              <a:tabLst/>
+              <a:defRPr/>
+            </a:pPr>
+            <a:r>
+              <a:rPr lang="en-US" dirty="0"/>
+              <a:t>http://www.epogue.info/cpsc-24700/Presentations/examples/w8code2/</a:t>
+            </a:r>
+            <a:r>
+              <a:rPr lang="en-US" dirty="0">
+                <a:cs typeface="Calibri" panose="020F0502020204030204" pitchFamily="34" charset="0"/>
+              </a:rPr>
+              <a:t>cell_span.html </a:t>
+            </a:r>
+            <a:endParaRPr lang="en-US" dirty="0"/>
+          </a:p>
+          <a:p>
+            <a:pPr marL="0" marR="0" lvl="0" indent="0" algn="l" defTabSz="914400" rtl="0" eaLnBrk="1" fontAlgn="auto" latinLnBrk="0" hangingPunct="1">
+              <a:lnSpc>
+                <a:spcPct val="100000"/>
+              </a:lnSpc>
+              <a:spcBef>
+                <a:spcPts val="0"/>
+              </a:spcBef>
+              <a:spcAft>
+                <a:spcPts val="0"/>
+              </a:spcAft>
+              <a:buClrTx/>
+              <a:buSzTx/>
+              <a:buFontTx/>
+              <a:buNone/>
+              <a:tabLst/>
+              <a:defRPr/>
+            </a:pPr>
+            <a:endParaRPr lang="en-US" dirty="0"/>
+          </a:p>
+          <a:p>
+            <a:endParaRPr lang="en-US" dirty="0"/>
+          </a:p>
+        </p:txBody>
+      </p:sp>
+      <p:sp>
+        <p:nvSpPr>
+          <p:cNvPr id="4" name="Slide Number Placeholder 3"/>
+          <p:cNvSpPr>
+            <a:spLocks noGrp="1"/>
+          </p:cNvSpPr>
+          <p:nvPr>
+            <p:ph type="sldNum" sz="quarter" idx="10"/>
+          </p:nvPr>
+        </p:nvSpPr>
+        <p:spPr/>
+        <p:txBody>
+          <a:bodyPr/>
+          <a:lstStyle/>
+          <a:p>
+            <a:fld id="{40F5A9F4-14AB-4E34-9372-28158D5523BB}" type="slidenum">
+              <a:rPr lang="en-US" smtClean="0"/>
+              <a:t>41</a:t>
+            </a:fld>
+            <a:endParaRPr lang="en-US"/>
+          </a:p>
+        </p:txBody>
+      </p:sp>
+    </p:spTree>
+    <p:extLst>
+      <p:ext uri="{BB962C8B-B14F-4D97-AF65-F5344CB8AC3E}">
+        <p14:creationId xmlns:p14="http://schemas.microsoft.com/office/powerpoint/2010/main" val="380958323"/>
+      </p:ext>
+    </p:extLst>
+  </p:cSld>
+  <p:clrMapOvr>
+    <a:masterClrMapping/>
+  </p:clrMapOvr>
+</p:notes>
+</file>
+
+<file path=ppt/notesSlides/notesSlide7.xml><?xml version="1.0" encoding="utf-8"?>
+<p:notes xmlns:a="http://schemas.openxmlformats.org/drawingml/2006/main" xmlns:r="http://schemas.openxmlformats.org/officeDocument/2006/relationships" xmlns:p="http://schemas.openxmlformats.org/presentationml/2006/main">
+  <p:cSld>
+    <p:spTree>
+      <p:nvGrpSpPr>
+        <p:cNvPr id="1" name=""/>
+        <p:cNvGrpSpPr/>
+        <p:nvPr/>
+      </p:nvGrpSpPr>
+      <p:grpSpPr>
+        <a:xfrm>
+          <a:off x="0" y="0"/>
+          <a:ext cx="0" cy="0"/>
+          <a:chOff x="0" y="0"/>
+          <a:chExt cx="0" cy="0"/>
+        </a:xfrm>
+      </p:grpSpPr>
+      <p:sp>
+        <p:nvSpPr>
+          <p:cNvPr id="2" name="Slide Image Placeholder 1"/>
+          <p:cNvSpPr>
+            <a:spLocks noGrp="1" noRot="1" noChangeAspect="1"/>
+          </p:cNvSpPr>
+          <p:nvPr>
+            <p:ph type="sldImg"/>
+          </p:nvPr>
+        </p:nvSpPr>
+        <p:spPr/>
+      </p:sp>
+      <p:sp>
+        <p:nvSpPr>
+          <p:cNvPr id="3" name="Notes Placeholder 2"/>
+          <p:cNvSpPr>
+            <a:spLocks noGrp="1"/>
+          </p:cNvSpPr>
+          <p:nvPr>
+            <p:ph type="body" idx="1"/>
+          </p:nvPr>
+        </p:nvSpPr>
+        <p:spPr/>
+        <p:txBody>
+          <a:bodyPr/>
+          <a:lstStyle/>
+          <a:p>
+            <a:r>
+              <a:rPr lang="en-US" dirty="0"/>
+              <a:t>Links:</a:t>
+            </a:r>
+          </a:p>
+          <a:p>
+            <a:pPr marL="0" marR="0" lvl="0" indent="0" algn="l" defTabSz="914400" rtl="0" eaLnBrk="1" fontAlgn="auto" latinLnBrk="0" hangingPunct="1">
+              <a:lnSpc>
+                <a:spcPct val="100000"/>
+              </a:lnSpc>
+              <a:spcBef>
+                <a:spcPts val="0"/>
+              </a:spcBef>
+              <a:spcAft>
+                <a:spcPts val="0"/>
+              </a:spcAft>
+              <a:buClrTx/>
+              <a:buSzTx/>
+              <a:buFontTx/>
+              <a:buNone/>
+              <a:tabLst/>
+              <a:defRPr/>
+            </a:pPr>
+            <a:r>
+              <a:rPr lang="en-US" dirty="0"/>
+              <a:t>http://www.epogue.info/cpsc-24700/Presentations/examples/w8code2/</a:t>
+            </a:r>
+            <a:r>
+              <a:rPr lang="en-US" dirty="0">
+                <a:cs typeface="Calibri" panose="020F0502020204030204" pitchFamily="34" charset="0"/>
+              </a:rPr>
+              <a:t>checkbox.html </a:t>
+            </a:r>
+            <a:endParaRPr lang="en-US" dirty="0"/>
+          </a:p>
+          <a:p>
+            <a:pPr marL="0" marR="0" lvl="0" indent="0" algn="l" defTabSz="914400" rtl="0" eaLnBrk="1" fontAlgn="auto" latinLnBrk="0" hangingPunct="1">
+              <a:lnSpc>
+                <a:spcPct val="100000"/>
+              </a:lnSpc>
+              <a:spcBef>
+                <a:spcPts val="0"/>
+              </a:spcBef>
+              <a:spcAft>
+                <a:spcPts val="0"/>
+              </a:spcAft>
+              <a:buClrTx/>
+              <a:buSzTx/>
+              <a:buFontTx/>
+              <a:buNone/>
+              <a:tabLst/>
+              <a:defRPr/>
+            </a:pPr>
+            <a:r>
+              <a:rPr lang="en-US" dirty="0"/>
+              <a:t>http://www.epogue.info/cpsc-24700/Presentations/examples/w8code2/</a:t>
+            </a:r>
+            <a:r>
+              <a:rPr lang="en-US" dirty="0">
+                <a:cs typeface="Calibri" panose="020F0502020204030204" pitchFamily="34" charset="0"/>
+              </a:rPr>
+              <a:t>menu.html </a:t>
+            </a:r>
+            <a:endParaRPr lang="en-US" dirty="0"/>
+          </a:p>
+          <a:p>
+            <a:pPr marL="0" marR="0" lvl="0" indent="0" algn="l" defTabSz="914400" rtl="0" eaLnBrk="1" fontAlgn="auto" latinLnBrk="0" hangingPunct="1">
+              <a:lnSpc>
+                <a:spcPct val="100000"/>
+              </a:lnSpc>
+              <a:spcBef>
+                <a:spcPts val="0"/>
+              </a:spcBef>
+              <a:spcAft>
+                <a:spcPts val="0"/>
+              </a:spcAft>
+              <a:buClrTx/>
+              <a:buSzTx/>
+              <a:buFontTx/>
+              <a:buNone/>
+              <a:tabLst/>
+              <a:defRPr/>
+            </a:pPr>
+            <a:r>
+              <a:rPr lang="en-US" dirty="0"/>
+              <a:t>http://www.epogue.info/cpsc-24700/Presentations/examples/w8code2/</a:t>
+            </a:r>
+            <a:r>
+              <a:rPr lang="en-US" dirty="0">
+                <a:cs typeface="Calibri" panose="020F0502020204030204" pitchFamily="34" charset="0"/>
+              </a:rPr>
+              <a:t>popcorn.html  </a:t>
+            </a:r>
+            <a:endParaRPr lang="en-US" dirty="0"/>
+          </a:p>
+          <a:p>
+            <a:pPr marL="0" marR="0" lvl="0" indent="0" algn="l" defTabSz="914400" rtl="0" eaLnBrk="1" fontAlgn="auto" latinLnBrk="0" hangingPunct="1">
+              <a:lnSpc>
+                <a:spcPct val="100000"/>
+              </a:lnSpc>
+              <a:spcBef>
+                <a:spcPts val="0"/>
+              </a:spcBef>
+              <a:spcAft>
+                <a:spcPts val="0"/>
+              </a:spcAft>
+              <a:buClrTx/>
+              <a:buSzTx/>
+              <a:buFontTx/>
+              <a:buNone/>
+              <a:tabLst/>
+              <a:defRPr/>
+            </a:pPr>
+            <a:r>
+              <a:rPr lang="en-US" dirty="0"/>
+              <a:t>http://www.epogue.info/cpsc-24700/Presentations/examples/w8code2/</a:t>
+            </a:r>
+            <a:r>
+              <a:rPr lang="en-US" dirty="0">
+                <a:cs typeface="Calibri" panose="020F0502020204030204" pitchFamily="34" charset="0"/>
+              </a:rPr>
+              <a:t>radio.html </a:t>
+            </a:r>
+            <a:endParaRPr lang="en-US" dirty="0"/>
+          </a:p>
+          <a:p>
+            <a:pPr marL="0" marR="0" lvl="0" indent="0" algn="l" defTabSz="914400" rtl="0" eaLnBrk="1" fontAlgn="auto" latinLnBrk="0" hangingPunct="1">
+              <a:lnSpc>
+                <a:spcPct val="100000"/>
+              </a:lnSpc>
+              <a:spcBef>
+                <a:spcPts val="0"/>
+              </a:spcBef>
+              <a:spcAft>
+                <a:spcPts val="0"/>
+              </a:spcAft>
+              <a:buClrTx/>
+              <a:buSzTx/>
+              <a:buFontTx/>
+              <a:buNone/>
+              <a:tabLst/>
+              <a:defRPr/>
+            </a:pPr>
+            <a:r>
+              <a:rPr lang="en-US" dirty="0"/>
+              <a:t>http://www.epogue.info/cpsc-24700/Presentations/examples/w8code2/</a:t>
+            </a:r>
+            <a:r>
+              <a:rPr lang="en-US" dirty="0">
+                <a:cs typeface="Calibri" panose="020F0502020204030204" pitchFamily="34" charset="0"/>
+              </a:rPr>
+              <a:t>textarea.html </a:t>
+            </a:r>
+            <a:endParaRPr lang="en-US" dirty="0"/>
+          </a:p>
+          <a:p>
+            <a:endParaRPr lang="en-US" dirty="0"/>
+          </a:p>
+        </p:txBody>
+      </p:sp>
+      <p:sp>
+        <p:nvSpPr>
+          <p:cNvPr id="4" name="Slide Number Placeholder 3"/>
+          <p:cNvSpPr>
+            <a:spLocks noGrp="1"/>
+          </p:cNvSpPr>
+          <p:nvPr>
+            <p:ph type="sldNum" sz="quarter" idx="10"/>
+          </p:nvPr>
+        </p:nvSpPr>
+        <p:spPr/>
+        <p:txBody>
+          <a:bodyPr/>
+          <a:lstStyle/>
+          <a:p>
+            <a:fld id="{40F5A9F4-14AB-4E34-9372-28158D5523BB}" type="slidenum">
+              <a:rPr lang="en-US" smtClean="0"/>
+              <a:t>55</a:t>
+            </a:fld>
+            <a:endParaRPr lang="en-US"/>
+          </a:p>
+        </p:txBody>
+      </p:sp>
+    </p:spTree>
+    <p:extLst>
+      <p:ext uri="{BB962C8B-B14F-4D97-AF65-F5344CB8AC3E}">
+        <p14:creationId xmlns:p14="http://schemas.microsoft.com/office/powerpoint/2010/main" val="3171651512"/>
+      </p:ext>
+    </p:extLst>
+  </p:cSld>
+  <p:clrMapOvr>
+    <a:masterClrMapping/>
+  </p:clrMapOvr>
+</p:notes>
+</file>
+
+<file path=ppt/notesSlides/notesSlide8.xml><?xml version="1.0" encoding="utf-8"?>
+<p:notes xmlns:a="http://schemas.openxmlformats.org/drawingml/2006/main" xmlns:r="http://schemas.openxmlformats.org/officeDocument/2006/relationships" xmlns:p="http://schemas.openxmlformats.org/presentationml/2006/main">
+  <p:cSld>
+    <p:spTree>
+      <p:nvGrpSpPr>
+        <p:cNvPr id="1" name=""/>
+        <p:cNvGrpSpPr/>
+        <p:nvPr/>
+      </p:nvGrpSpPr>
+      <p:grpSpPr>
+        <a:xfrm>
+          <a:off x="0" y="0"/>
+          <a:ext cx="0" cy="0"/>
+          <a:chOff x="0" y="0"/>
+          <a:chExt cx="0" cy="0"/>
+        </a:xfrm>
+      </p:grpSpPr>
+      <p:sp>
+        <p:nvSpPr>
+          <p:cNvPr id="2" name="Slide Image Placeholder 1"/>
+          <p:cNvSpPr>
+            <a:spLocks noGrp="1" noRot="1" noChangeAspect="1"/>
+          </p:cNvSpPr>
+          <p:nvPr>
+            <p:ph type="sldImg"/>
+          </p:nvPr>
+        </p:nvSpPr>
+        <p:spPr/>
+      </p:sp>
+      <p:sp>
+        <p:nvSpPr>
+          <p:cNvPr id="3" name="Notes Placeholder 2"/>
+          <p:cNvSpPr>
+            <a:spLocks noGrp="1"/>
+          </p:cNvSpPr>
+          <p:nvPr>
+            <p:ph type="body" idx="1"/>
+          </p:nvPr>
+        </p:nvSpPr>
+        <p:spPr/>
+        <p:txBody>
+          <a:bodyPr/>
+          <a:lstStyle/>
+          <a:p>
+            <a:r>
+              <a:rPr lang="en-US" dirty="0"/>
+              <a:t>Links:</a:t>
+            </a:r>
+          </a:p>
+          <a:p>
+            <a:pPr marL="0" marR="0" lvl="0" indent="0" algn="l" defTabSz="914400" rtl="0" eaLnBrk="1" fontAlgn="auto" latinLnBrk="0" hangingPunct="1">
+              <a:lnSpc>
+                <a:spcPct val="100000"/>
+              </a:lnSpc>
+              <a:spcBef>
+                <a:spcPts val="0"/>
+              </a:spcBef>
+              <a:spcAft>
+                <a:spcPts val="0"/>
+              </a:spcAft>
+              <a:buClrTx/>
+              <a:buSzTx/>
+              <a:buFontTx/>
+              <a:buNone/>
+              <a:tabLst/>
+              <a:defRPr/>
+            </a:pPr>
+            <a:r>
+              <a:rPr lang="en-US" dirty="0"/>
+              <a:t>http://www.epogue.info/cpsc-24700/Presentations/examples/w8code2/</a:t>
+            </a:r>
+            <a:r>
+              <a:rPr lang="en-US" dirty="0">
+                <a:cs typeface="Calibri" panose="020F0502020204030204" pitchFamily="34" charset="0"/>
+              </a:rPr>
+              <a:t>audio.html </a:t>
+            </a:r>
+            <a:endParaRPr lang="en-US" dirty="0"/>
+          </a:p>
+          <a:p>
+            <a:pPr marL="0" marR="0" lvl="0" indent="0" algn="l" defTabSz="914400" rtl="0" eaLnBrk="1" fontAlgn="auto" latinLnBrk="0" hangingPunct="1">
+              <a:lnSpc>
+                <a:spcPct val="100000"/>
+              </a:lnSpc>
+              <a:spcBef>
+                <a:spcPts val="0"/>
+              </a:spcBef>
+              <a:spcAft>
+                <a:spcPts val="0"/>
+              </a:spcAft>
+              <a:buClrTx/>
+              <a:buSzTx/>
+              <a:buFontTx/>
+              <a:buNone/>
+              <a:tabLst/>
+              <a:defRPr/>
+            </a:pPr>
+            <a:r>
+              <a:rPr lang="en-US" dirty="0"/>
+              <a:t>http://www.epogue.info/cpsc-24700/Presentations/examples/w8code2/</a:t>
+            </a:r>
+            <a:r>
+              <a:rPr lang="en-US" dirty="0">
+                <a:cs typeface="Calibri" panose="020F0502020204030204" pitchFamily="34" charset="0"/>
+              </a:rPr>
+              <a:t>organized.html </a:t>
+            </a:r>
+            <a:endParaRPr lang="en-US" dirty="0"/>
+          </a:p>
+          <a:p>
+            <a:pPr marL="0" marR="0" lvl="0" indent="0" algn="l" defTabSz="914400" rtl="0" eaLnBrk="1" fontAlgn="auto" latinLnBrk="0" hangingPunct="1">
+              <a:lnSpc>
+                <a:spcPct val="100000"/>
+              </a:lnSpc>
+              <a:spcBef>
+                <a:spcPts val="0"/>
+              </a:spcBef>
+              <a:spcAft>
+                <a:spcPts val="0"/>
+              </a:spcAft>
+              <a:buClrTx/>
+              <a:buSzTx/>
+              <a:buFontTx/>
+              <a:buNone/>
+              <a:tabLst/>
+              <a:defRPr/>
+            </a:pPr>
+            <a:r>
+              <a:rPr lang="en-US" dirty="0"/>
+              <a:t>http://www.epogue.info/cpsc-24700/Presentations/examples/w8code2/</a:t>
+            </a:r>
+            <a:r>
+              <a:rPr lang="en-US" dirty="0">
+                <a:cs typeface="Calibri" panose="020F0502020204030204" pitchFamily="34" charset="0"/>
+              </a:rPr>
+              <a:t>tester.html  </a:t>
+            </a:r>
+            <a:endParaRPr lang="en-US" dirty="0"/>
+          </a:p>
+          <a:p>
+            <a:pPr marL="0" marR="0" lvl="0" indent="0" algn="l" defTabSz="914400" rtl="0" eaLnBrk="1" fontAlgn="auto" latinLnBrk="0" hangingPunct="1">
+              <a:lnSpc>
+                <a:spcPct val="100000"/>
+              </a:lnSpc>
+              <a:spcBef>
+                <a:spcPts val="0"/>
+              </a:spcBef>
+              <a:spcAft>
+                <a:spcPts val="0"/>
+              </a:spcAft>
+              <a:buClrTx/>
+              <a:buSzTx/>
+              <a:buFontTx/>
+              <a:buNone/>
+              <a:tabLst/>
+              <a:defRPr/>
+            </a:pPr>
+            <a:r>
+              <a:rPr lang="en-US" dirty="0"/>
+              <a:t>http://www.epogue.info/cpsc-24700/Presentations/examples/w8code2/</a:t>
+            </a:r>
+            <a:r>
+              <a:rPr lang="en-US" dirty="0">
+                <a:cs typeface="Calibri" panose="020F0502020204030204" pitchFamily="34" charset="0"/>
+              </a:rPr>
+              <a:t>testvideo.html </a:t>
+            </a:r>
+            <a:endParaRPr lang="en-US" dirty="0"/>
+          </a:p>
+          <a:p>
+            <a:endParaRPr lang="en-US" dirty="0"/>
+          </a:p>
+        </p:txBody>
+      </p:sp>
+      <p:sp>
+        <p:nvSpPr>
+          <p:cNvPr id="4" name="Slide Number Placeholder 3"/>
+          <p:cNvSpPr>
+            <a:spLocks noGrp="1"/>
+          </p:cNvSpPr>
+          <p:nvPr>
+            <p:ph type="sldNum" sz="quarter" idx="10"/>
+          </p:nvPr>
+        </p:nvSpPr>
+        <p:spPr/>
+        <p:txBody>
+          <a:bodyPr/>
+          <a:lstStyle/>
+          <a:p>
+            <a:fld id="{40F5A9F4-14AB-4E34-9372-28158D5523BB}" type="slidenum">
+              <a:rPr lang="en-US" smtClean="0"/>
+              <a:t>65</a:t>
+            </a:fld>
+            <a:endParaRPr lang="en-US"/>
+          </a:p>
+        </p:txBody>
+      </p:sp>
+    </p:spTree>
+    <p:extLst>
+      <p:ext uri="{BB962C8B-B14F-4D97-AF65-F5344CB8AC3E}">
+        <p14:creationId xmlns:p14="http://schemas.microsoft.com/office/powerpoint/2010/main" val="1098866391"/>
+      </p:ext>
+    </p:extLst>
+  </p:cSld>
+  <p:clrMapOvr>
+    <a:masterClrMapping/>
+  </p:clrMapOvr>
+</p:notes>
+</file>
+
 <file path=ppt/slideLayouts/slideLayout1.xml><?xml version="1.0" encoding="utf-8"?>
 <p:sldLayout xmlns:a="http://schemas.openxmlformats.org/drawingml/2006/main" xmlns:r="http://schemas.openxmlformats.org/officeDocument/2006/relationships" xmlns:p="http://schemas.openxmlformats.org/presentationml/2006/main" type="title" preserve="1">
   <p:cSld name="Title Slide">
@@ -1099,7 +1933,7 @@
           <a:p>
             <a:fld id="{FB7712AD-3B21-4FE9-B722-CF9B0200D9B9}" type="datetimeFigureOut">
               <a:rPr lang="en-US" smtClean="0"/>
-              <a:t>9/6/2017</a:t>
+              <a:t>9/7/2017</a:t>
             </a:fld>
             <a:endParaRPr lang="en-US"/>
           </a:p>
@@ -1279,7 +2113,7 @@
           <a:p>
             <a:fld id="{FB7712AD-3B21-4FE9-B722-CF9B0200D9B9}" type="datetimeFigureOut">
               <a:rPr lang="en-US" smtClean="0"/>
-              <a:t>9/6/2017</a:t>
+              <a:t>9/7/2017</a:t>
             </a:fld>
             <a:endParaRPr lang="en-US"/>
           </a:p>
@@ -1469,7 +2303,7 @@
           <a:p>
             <a:fld id="{FB7712AD-3B21-4FE9-B722-CF9B0200D9B9}" type="datetimeFigureOut">
               <a:rPr lang="en-US" smtClean="0"/>
-              <a:t>9/6/2017</a:t>
+              <a:t>9/7/2017</a:t>
             </a:fld>
             <a:endParaRPr lang="en-US"/>
           </a:p>
@@ -1692,7 +2526,7 @@
           <a:p>
             <a:fld id="{FB7712AD-3B21-4FE9-B722-CF9B0200D9B9}" type="datetimeFigureOut">
               <a:rPr lang="en-US" smtClean="0"/>
-              <a:t>9/6/2017</a:t>
+              <a:t>9/7/2017</a:t>
             </a:fld>
             <a:endParaRPr lang="en-US"/>
           </a:p>
@@ -1895,7 +2729,7 @@
           <a:p>
             <a:fld id="{FB7712AD-3B21-4FE9-B722-CF9B0200D9B9}" type="datetimeFigureOut">
               <a:rPr lang="en-US" smtClean="0"/>
-              <a:t>9/6/2017</a:t>
+              <a:t>9/7/2017</a:t>
             </a:fld>
             <a:endParaRPr lang="en-US"/>
           </a:p>
@@ -2192,7 +3026,7 @@
           <a:p>
             <a:fld id="{FB7712AD-3B21-4FE9-B722-CF9B0200D9B9}" type="datetimeFigureOut">
               <a:rPr lang="en-US" smtClean="0"/>
-              <a:t>9/6/2017</a:t>
+              <a:t>9/7/2017</a:t>
             </a:fld>
             <a:endParaRPr lang="en-US"/>
           </a:p>
@@ -2628,7 +3462,7 @@
           <a:p>
             <a:fld id="{FB7712AD-3B21-4FE9-B722-CF9B0200D9B9}" type="datetimeFigureOut">
               <a:rPr lang="en-US" smtClean="0"/>
-              <a:t>9/6/2017</a:t>
+              <a:t>9/7/2017</a:t>
             </a:fld>
             <a:endParaRPr lang="en-US"/>
           </a:p>
@@ -2757,7 +3591,7 @@
           <a:p>
             <a:fld id="{FB7712AD-3B21-4FE9-B722-CF9B0200D9B9}" type="datetimeFigureOut">
               <a:rPr lang="en-US" smtClean="0"/>
-              <a:t>9/6/2017</a:t>
+              <a:t>9/7/2017</a:t>
             </a:fld>
             <a:endParaRPr lang="en-US"/>
           </a:p>
@@ -2864,7 +3698,7 @@
           <a:p>
             <a:fld id="{FB7712AD-3B21-4FE9-B722-CF9B0200D9B9}" type="datetimeFigureOut">
               <a:rPr lang="en-US" smtClean="0"/>
-              <a:t>9/6/2017</a:t>
+              <a:t>9/7/2017</a:t>
             </a:fld>
             <a:endParaRPr lang="en-US"/>
           </a:p>
@@ -3151,7 +3985,7 @@
           <a:p>
             <a:fld id="{FB7712AD-3B21-4FE9-B722-CF9B0200D9B9}" type="datetimeFigureOut">
               <a:rPr lang="en-US" smtClean="0"/>
-              <a:t>9/6/2017</a:t>
+              <a:t>9/7/2017</a:t>
             </a:fld>
             <a:endParaRPr lang="en-US"/>
           </a:p>
@@ -3418,7 +4252,7 @@
           <a:p>
             <a:fld id="{FB7712AD-3B21-4FE9-B722-CF9B0200D9B9}" type="datetimeFigureOut">
               <a:rPr lang="en-US" smtClean="0"/>
-              <a:t>9/6/2017</a:t>
+              <a:t>9/7/2017</a:t>
             </a:fld>
             <a:endParaRPr lang="en-US"/>
           </a:p>
@@ -3744,7 +4578,7 @@
           <a:p>
             <a:fld id="{FB7712AD-3B21-4FE9-B722-CF9B0200D9B9}" type="datetimeFigureOut">
               <a:rPr lang="en-US" smtClean="0"/>
-              <a:t>9/6/2017</a:t>
+              <a:t>9/7/2017</a:t>
             </a:fld>
             <a:endParaRPr lang="en-US"/>
           </a:p>
@@ -7599,7 +8433,7 @@
           <a:graphicData uri="http://schemas.openxmlformats.org/presentationml/2006/ole">
             <mc:AlternateContent xmlns:mc="http://schemas.openxmlformats.org/markup-compatibility/2006">
               <mc:Choice xmlns:v="urn:schemas-microsoft-com:vml" Requires="v">
-                <p:oleObj spid="_x0000_s1331" name="Document" r:id="rId3" imgW="5477256" imgH="2514600" progId="Word.Document.8">
+                <p:oleObj spid="_x0000_s1333" name="Document" r:id="rId3" imgW="5477256" imgH="2514600" progId="Word.Document.8">
                   <p:embed/>
                 </p:oleObj>
               </mc:Choice>
@@ -14600,49 +15434,90 @@
           <a:p>
             <a:pPr algn="ctr"/>
             <a:endParaRPr lang="en-US" dirty="0">
-              <a:latin typeface="Consolas" panose="020B0609020204030204" pitchFamily="49" charset="0"/>
-              <a:cs typeface="Consolas" panose="020B0609020204030204" pitchFamily="49" charset="0"/>
+              <a:cs typeface="Calibri" panose="020F0502020204030204" pitchFamily="34" charset="0"/>
             </a:endParaRPr>
           </a:p>
           <a:p>
             <a:pPr algn="ctr"/>
             <a:r>
               <a:rPr lang="en-US" dirty="0">
-                <a:latin typeface="Consolas" panose="020B0609020204030204" pitchFamily="49" charset="0"/>
-                <a:cs typeface="Consolas" panose="020B0609020204030204" pitchFamily="49" charset="0"/>
-              </a:rPr>
-              <a:t>ordered.html</a:t>
-            </a:r>
+                <a:cs typeface="Calibri" panose="020F0502020204030204" pitchFamily="34" charset="0"/>
+              </a:rPr>
+              <a:t>ordered.html </a:t>
+            </a:r>
+            <a:r>
+              <a:rPr lang="en-US" dirty="0">
+                <a:cs typeface="Calibri" panose="020F0502020204030204" pitchFamily="34" charset="0"/>
+                <a:hlinkClick r:id="rId3"/>
+              </a:rPr>
+              <a:t>[link] </a:t>
+            </a:r>
+            <a:endParaRPr lang="en-US" dirty="0">
+              <a:cs typeface="Calibri" panose="020F0502020204030204" pitchFamily="34" charset="0"/>
+            </a:endParaRPr>
           </a:p>
           <a:p>
             <a:pPr algn="ctr"/>
             <a:r>
               <a:rPr lang="en-US" dirty="0">
-                <a:latin typeface="Consolas" panose="020B0609020204030204" pitchFamily="49" charset="0"/>
-                <a:cs typeface="Consolas" panose="020B0609020204030204" pitchFamily="49" charset="0"/>
-              </a:rPr>
-              <a:t>unordered.html</a:t>
-            </a:r>
+                <a:cs typeface="Calibri" panose="020F0502020204030204" pitchFamily="34" charset="0"/>
+              </a:rPr>
+              <a:t>unordered.html </a:t>
+            </a:r>
+            <a:r>
+              <a:rPr lang="en-US" dirty="0">
+                <a:cs typeface="Calibri" panose="020F0502020204030204" pitchFamily="34" charset="0"/>
+                <a:hlinkClick r:id="rId4"/>
+              </a:rPr>
+              <a:t>[link] </a:t>
+            </a:r>
+            <a:endParaRPr lang="en-US" dirty="0">
+              <a:cs typeface="Calibri" panose="020F0502020204030204" pitchFamily="34" charset="0"/>
+            </a:endParaRPr>
           </a:p>
           <a:p>
             <a:pPr algn="ctr"/>
             <a:r>
               <a:rPr lang="en-US" dirty="0">
-                <a:latin typeface="Consolas" panose="020B0609020204030204" pitchFamily="49" charset="0"/>
-                <a:cs typeface="Consolas" panose="020B0609020204030204" pitchFamily="49" charset="0"/>
-              </a:rPr>
-              <a:t>definition.html</a:t>
-            </a:r>
+                <a:cs typeface="Calibri" panose="020F0502020204030204" pitchFamily="34" charset="0"/>
+              </a:rPr>
+              <a:t>definition.html </a:t>
+            </a:r>
+            <a:r>
+              <a:rPr lang="en-US" dirty="0">
+                <a:cs typeface="Calibri" panose="020F0502020204030204" pitchFamily="34" charset="0"/>
+                <a:hlinkClick r:id="rId5"/>
+              </a:rPr>
+              <a:t>[link] </a:t>
+            </a:r>
+            <a:endParaRPr lang="en-US" dirty="0">
+              <a:cs typeface="Calibri" panose="020F0502020204030204" pitchFamily="34" charset="0"/>
+            </a:endParaRPr>
           </a:p>
           <a:p>
             <a:pPr algn="ctr"/>
             <a:r>
               <a:rPr lang="en-US" dirty="0">
-                <a:latin typeface="Consolas" panose="020B0609020204030204" pitchFamily="49" charset="0"/>
-                <a:cs typeface="Consolas" panose="020B0609020204030204" pitchFamily="49" charset="0"/>
-              </a:rPr>
-              <a:t>nested_lists.html</a:t>
-            </a:r>
+                <a:cs typeface="Calibri" panose="020F0502020204030204" pitchFamily="34" charset="0"/>
+              </a:rPr>
+              <a:t>nested_lists.html </a:t>
+            </a:r>
+            <a:r>
+              <a:rPr lang="en-US" dirty="0">
+                <a:cs typeface="Calibri" panose="020F0502020204030204" pitchFamily="34" charset="0"/>
+                <a:hlinkClick r:id="rId6"/>
+              </a:rPr>
+              <a:t>[link] </a:t>
+            </a:r>
+            <a:endParaRPr lang="en-US" dirty="0">
+              <a:cs typeface="Calibri" panose="020F0502020204030204" pitchFamily="34" charset="0"/>
+            </a:endParaRPr>
+          </a:p>
+          <a:p>
+            <a:pPr algn="ctr"/>
+            <a:endParaRPr lang="en-US" dirty="0">
+              <a:cs typeface="Calibri" panose="020F0502020204030204" pitchFamily="34" charset="0"/>
+            </a:endParaRPr>
           </a:p>
         </p:txBody>
       </p:sp>
@@ -17038,7 +17913,7 @@
         <p:spPr/>
         <p:txBody>
           <a:bodyPr>
-            <a:normAutofit/>
+            <a:normAutofit lnSpcReduction="10000"/>
           </a:bodyPr>
           <a:lstStyle/>
           <a:p>
@@ -17083,7 +17958,7 @@
                   <a:srgbClr val="7030A0"/>
                 </a:solidFill>
               </a:rPr>
-              <a:t>Use tables only when the information is naturally tabular</a:t>
+              <a:t>Use tables only when the information is naturally tabular… this is different that it used to be prior to HTML5</a:t>
             </a:r>
           </a:p>
         </p:txBody>
@@ -17393,29 +18268,46 @@
           <a:p>
             <a:pPr algn="ctr"/>
             <a:endParaRPr lang="en-US" dirty="0">
-              <a:latin typeface="Consolas" panose="020B0609020204030204" pitchFamily="49" charset="0"/>
-              <a:cs typeface="Consolas" panose="020B0609020204030204" pitchFamily="49" charset="0"/>
+              <a:cs typeface="Calibri" panose="020F0502020204030204" pitchFamily="34" charset="0"/>
             </a:endParaRPr>
           </a:p>
           <a:p>
             <a:pPr algn="ctr"/>
             <a:r>
               <a:rPr lang="en-US" dirty="0">
-                <a:latin typeface="Consolas" panose="020B0609020204030204" pitchFamily="49" charset="0"/>
-                <a:cs typeface="Consolas" panose="020B0609020204030204" pitchFamily="49" charset="0"/>
-              </a:rPr>
-              <a:t>table.html</a:t>
-            </a:r>
+                <a:cs typeface="Calibri" panose="020F0502020204030204" pitchFamily="34" charset="0"/>
+              </a:rPr>
+              <a:t>table.html </a:t>
+            </a:r>
+            <a:r>
+              <a:rPr lang="en-US" dirty="0">
+                <a:cs typeface="Calibri" panose="020F0502020204030204" pitchFamily="34" charset="0"/>
+                <a:hlinkClick r:id="rId3"/>
+              </a:rPr>
+              <a:t>[link]</a:t>
+            </a:r>
+            <a:endParaRPr lang="en-US" dirty="0">
+              <a:cs typeface="Calibri" panose="020F0502020204030204" pitchFamily="34" charset="0"/>
+            </a:endParaRPr>
           </a:p>
           <a:p>
             <a:pPr algn="ctr"/>
             <a:r>
               <a:rPr lang="en-US" dirty="0">
-                <a:latin typeface="Consolas" panose="020B0609020204030204" pitchFamily="49" charset="0"/>
-                <a:cs typeface="Consolas" panose="020B0609020204030204" pitchFamily="49" charset="0"/>
-              </a:rPr>
-              <a:t>cell_span.html</a:t>
-            </a:r>
+                <a:cs typeface="Calibri" panose="020F0502020204030204" pitchFamily="34" charset="0"/>
+              </a:rPr>
+              <a:t>cell_span.html </a:t>
+            </a:r>
+            <a:r>
+              <a:rPr lang="en-US" dirty="0">
+                <a:cs typeface="Calibri" panose="020F0502020204030204" pitchFamily="34" charset="0"/>
+                <a:hlinkClick r:id="rId4"/>
+              </a:rPr>
+              <a:t>[link]</a:t>
+            </a:r>
+            <a:endParaRPr lang="en-US" dirty="0">
+              <a:cs typeface="Calibri" panose="020F0502020204030204" pitchFamily="34" charset="0"/>
+            </a:endParaRPr>
           </a:p>
         </p:txBody>
       </p:sp>
@@ -23245,65 +24137,108 @@
           <a:p>
             <a:pPr algn="ctr"/>
             <a:endParaRPr lang="en-US" dirty="0">
-              <a:latin typeface="Consolas" panose="020B0609020204030204" pitchFamily="49" charset="0"/>
-              <a:cs typeface="Consolas" panose="020B0609020204030204" pitchFamily="49" charset="0"/>
+              <a:cs typeface="Calibri" panose="020F0502020204030204" pitchFamily="34" charset="0"/>
             </a:endParaRPr>
           </a:p>
           <a:p>
             <a:pPr algn="ctr"/>
             <a:r>
               <a:rPr lang="en-US" dirty="0">
-                <a:latin typeface="Consolas" panose="020B0609020204030204" pitchFamily="49" charset="0"/>
-                <a:cs typeface="Consolas" panose="020B0609020204030204" pitchFamily="49" charset="0"/>
-              </a:rPr>
-              <a:t>checkbox.html</a:t>
-            </a:r>
+                <a:cs typeface="Calibri" panose="020F0502020204030204" pitchFamily="34" charset="0"/>
+              </a:rPr>
+              <a:t>checkbox.html </a:t>
+            </a:r>
+            <a:r>
+              <a:rPr lang="en-US" dirty="0">
+                <a:cs typeface="Calibri" panose="020F0502020204030204" pitchFamily="34" charset="0"/>
+                <a:hlinkClick r:id="rId3"/>
+              </a:rPr>
+              <a:t>[link]</a:t>
+            </a:r>
+            <a:endParaRPr lang="en-US" dirty="0">
+              <a:cs typeface="Calibri" panose="020F0502020204030204" pitchFamily="34" charset="0"/>
+            </a:endParaRPr>
           </a:p>
           <a:p>
             <a:pPr algn="ctr"/>
             <a:r>
               <a:rPr lang="en-US" dirty="0">
-                <a:latin typeface="Consolas" panose="020B0609020204030204" pitchFamily="49" charset="0"/>
-                <a:cs typeface="Consolas" panose="020B0609020204030204" pitchFamily="49" charset="0"/>
-              </a:rPr>
-              <a:t>menu.html</a:t>
-            </a:r>
+                <a:cs typeface="Calibri" panose="020F0502020204030204" pitchFamily="34" charset="0"/>
+              </a:rPr>
+              <a:t>menu.html </a:t>
+            </a:r>
+            <a:r>
+              <a:rPr lang="en-US" dirty="0">
+                <a:cs typeface="Calibri" panose="020F0502020204030204" pitchFamily="34" charset="0"/>
+                <a:hlinkClick r:id="rId4"/>
+              </a:rPr>
+              <a:t>[link]</a:t>
+            </a:r>
+            <a:endParaRPr lang="en-US" dirty="0">
+              <a:cs typeface="Calibri" panose="020F0502020204030204" pitchFamily="34" charset="0"/>
+            </a:endParaRPr>
           </a:p>
           <a:p>
             <a:pPr algn="ctr"/>
             <a:r>
               <a:rPr lang="en-US" dirty="0">
-                <a:latin typeface="Consolas" panose="020B0609020204030204" pitchFamily="49" charset="0"/>
-                <a:cs typeface="Consolas" panose="020B0609020204030204" pitchFamily="49" charset="0"/>
-              </a:rPr>
-              <a:t>popcorn.html</a:t>
-            </a:r>
+                <a:cs typeface="Calibri" panose="020F0502020204030204" pitchFamily="34" charset="0"/>
+              </a:rPr>
+              <a:t>popcorn.html </a:t>
+            </a:r>
+            <a:r>
+              <a:rPr lang="en-US" dirty="0">
+                <a:cs typeface="Calibri" panose="020F0502020204030204" pitchFamily="34" charset="0"/>
+                <a:hlinkClick r:id="rId5"/>
+              </a:rPr>
+              <a:t>[link]</a:t>
+            </a:r>
+            <a:endParaRPr lang="en-US" dirty="0">
+              <a:cs typeface="Calibri" panose="020F0502020204030204" pitchFamily="34" charset="0"/>
+            </a:endParaRPr>
           </a:p>
           <a:p>
             <a:pPr algn="ctr"/>
             <a:r>
               <a:rPr lang="en-US" dirty="0">
-                <a:latin typeface="Consolas" panose="020B0609020204030204" pitchFamily="49" charset="0"/>
-                <a:cs typeface="Consolas" panose="020B0609020204030204" pitchFamily="49" charset="0"/>
-              </a:rPr>
-              <a:t>radio.html</a:t>
-            </a:r>
+                <a:cs typeface="Calibri" panose="020F0502020204030204" pitchFamily="34" charset="0"/>
+              </a:rPr>
+              <a:t>radio.html </a:t>
+            </a:r>
+            <a:r>
+              <a:rPr lang="en-US" dirty="0">
+                <a:cs typeface="Calibri" panose="020F0502020204030204" pitchFamily="34" charset="0"/>
+                <a:hlinkClick r:id="rId6"/>
+              </a:rPr>
+              <a:t>[link]</a:t>
+            </a:r>
+            <a:endParaRPr lang="en-US" dirty="0">
+              <a:cs typeface="Calibri" panose="020F0502020204030204" pitchFamily="34" charset="0"/>
+            </a:endParaRPr>
           </a:p>
           <a:p>
             <a:pPr algn="ctr"/>
             <a:r>
               <a:rPr lang="en-US" dirty="0">
-                <a:latin typeface="Consolas" panose="020B0609020204030204" pitchFamily="49" charset="0"/>
-                <a:cs typeface="Consolas" panose="020B0609020204030204" pitchFamily="49" charset="0"/>
-              </a:rPr>
-              <a:t>textarea.html</a:t>
-            </a:r>
+                <a:cs typeface="Calibri" panose="020F0502020204030204" pitchFamily="34" charset="0"/>
+              </a:rPr>
+              <a:t>textarea.html </a:t>
+            </a:r>
+            <a:r>
+              <a:rPr lang="en-US" dirty="0">
+                <a:cs typeface="Calibri" panose="020F0502020204030204" pitchFamily="34" charset="0"/>
+                <a:hlinkClick r:id="rId7"/>
+              </a:rPr>
+              <a:t>[link]</a:t>
+            </a:r>
+            <a:endParaRPr lang="en-US" dirty="0">
+              <a:cs typeface="Calibri" panose="020F0502020204030204" pitchFamily="34" charset="0"/>
+            </a:endParaRPr>
           </a:p>
           <a:p>
             <a:pPr algn="ctr"/>
             <a:endParaRPr lang="en-US" dirty="0">
-              <a:latin typeface="Consolas" panose="020B0609020204030204" pitchFamily="49" charset="0"/>
-              <a:cs typeface="Consolas" panose="020B0609020204030204" pitchFamily="49" charset="0"/>
+              <a:cs typeface="Calibri" panose="020F0502020204030204" pitchFamily="34" charset="0"/>
             </a:endParaRPr>
           </a:p>
         </p:txBody>
@@ -28070,49 +29005,84 @@
           <a:p>
             <a:pPr algn="ctr"/>
             <a:endParaRPr lang="en-US" dirty="0">
-              <a:latin typeface="Consolas" panose="020B0609020204030204" pitchFamily="49" charset="0"/>
-              <a:cs typeface="Consolas" panose="020B0609020204030204" pitchFamily="49" charset="0"/>
+              <a:cs typeface="Calibri" panose="020F0502020204030204" pitchFamily="34" charset="0"/>
             </a:endParaRPr>
           </a:p>
           <a:p>
             <a:pPr algn="ctr"/>
             <a:r>
               <a:rPr lang="en-US" dirty="0">
-                <a:latin typeface="Consolas" panose="020B0609020204030204" pitchFamily="49" charset="0"/>
-                <a:cs typeface="Consolas" panose="020B0609020204030204" pitchFamily="49" charset="0"/>
-              </a:rPr>
-              <a:t>audio.html</a:t>
-            </a:r>
+                <a:cs typeface="Calibri" panose="020F0502020204030204" pitchFamily="34" charset="0"/>
+              </a:rPr>
+              <a:t>audio.html </a:t>
+            </a:r>
+            <a:r>
+              <a:rPr lang="en-US" dirty="0">
+                <a:cs typeface="Calibri" panose="020F0502020204030204" pitchFamily="34" charset="0"/>
+                <a:hlinkClick r:id="rId3"/>
+              </a:rPr>
+              <a:t>[link]</a:t>
+            </a:r>
+            <a:endParaRPr lang="en-US" dirty="0">
+              <a:cs typeface="Calibri" panose="020F0502020204030204" pitchFamily="34" charset="0"/>
+            </a:endParaRPr>
           </a:p>
           <a:p>
             <a:pPr algn="ctr"/>
             <a:r>
               <a:rPr lang="en-US" dirty="0">
-                <a:latin typeface="Consolas" panose="020B0609020204030204" pitchFamily="49" charset="0"/>
-                <a:cs typeface="Consolas" panose="020B0609020204030204" pitchFamily="49" charset="0"/>
-              </a:rPr>
-              <a:t>organized.html</a:t>
-            </a:r>
+                <a:cs typeface="Calibri" panose="020F0502020204030204" pitchFamily="34" charset="0"/>
+              </a:rPr>
+              <a:t>organized.html </a:t>
+            </a:r>
+            <a:r>
+              <a:rPr lang="en-US" dirty="0">
+                <a:cs typeface="Calibri" panose="020F0502020204030204" pitchFamily="34" charset="0"/>
+                <a:hlinkClick r:id="rId4"/>
+              </a:rPr>
+              <a:t>[link]</a:t>
+            </a:r>
+            <a:endParaRPr lang="en-US" dirty="0">
+              <a:cs typeface="Calibri" panose="020F0502020204030204" pitchFamily="34" charset="0"/>
+            </a:endParaRPr>
           </a:p>
           <a:p>
             <a:pPr algn="ctr"/>
             <a:r>
               <a:rPr lang="en-US" dirty="0">
-                <a:latin typeface="Consolas" panose="020B0609020204030204" pitchFamily="49" charset="0"/>
-                <a:cs typeface="Consolas" panose="020B0609020204030204" pitchFamily="49" charset="0"/>
-              </a:rPr>
-              <a:t>tester.html</a:t>
-            </a:r>
+                <a:cs typeface="Calibri" panose="020F0502020204030204" pitchFamily="34" charset="0"/>
+              </a:rPr>
+              <a:t>tester.html </a:t>
+            </a:r>
+            <a:r>
+              <a:rPr lang="en-US" dirty="0">
+                <a:cs typeface="Calibri" panose="020F0502020204030204" pitchFamily="34" charset="0"/>
+                <a:hlinkClick r:id="rId5"/>
+              </a:rPr>
+              <a:t>[link]</a:t>
+            </a:r>
+            <a:endParaRPr lang="en-US" dirty="0">
+              <a:cs typeface="Calibri" panose="020F0502020204030204" pitchFamily="34" charset="0"/>
+            </a:endParaRPr>
           </a:p>
           <a:p>
             <a:pPr algn="ctr"/>
             <a:r>
               <a:rPr lang="en-US" dirty="0">
-                <a:latin typeface="Consolas" panose="020B0609020204030204" pitchFamily="49" charset="0"/>
-                <a:cs typeface="Consolas" panose="020B0609020204030204" pitchFamily="49" charset="0"/>
-              </a:rPr>
-              <a:t>testvideo.html</a:t>
-            </a:r>
+                <a:cs typeface="Calibri" panose="020F0502020204030204" pitchFamily="34" charset="0"/>
+              </a:rPr>
+              <a:t>testvideo.html </a:t>
+            </a:r>
+            <a:r>
+              <a:rPr lang="en-US" dirty="0">
+                <a:cs typeface="Calibri" panose="020F0502020204030204" pitchFamily="34" charset="0"/>
+                <a:hlinkClick r:id="rId6"/>
+              </a:rPr>
+              <a:t>[link]</a:t>
+            </a:r>
+            <a:endParaRPr lang="en-US" dirty="0">
+              <a:cs typeface="Calibri" panose="020F0502020204030204" pitchFamily="34" charset="0"/>
+            </a:endParaRPr>
           </a:p>
         </p:txBody>
       </p:sp>
@@ -28754,7 +29724,7 @@
               <a:rPr lang="en-US" dirty="0">
                 <a:hlinkClick r:id="rId2"/>
               </a:rPr>
-              <a:t>http://validator.w3.org/#validate_by_upload+with_options</a:t>
+              <a:t>http://validator.w3.org/</a:t>
             </a:r>
             <a:endParaRPr lang="en-US" dirty="0"/>
           </a:p>

</xml_diff>